<commit_message>
Feito ajustes na geraçao de provas e gabaritos
</commit_message>
<xml_diff>
--- a/logos/IdentidadeVisual.pptx
+++ b/logos/IdentidadeVisual.pptx
@@ -5,7 +5,7 @@
     <p:sldMasterId id="2147483648" r:id="rId1"/>
   </p:sldMasterIdLst>
   <p:notesMasterIdLst>
-    <p:notesMasterId r:id="rId7"/>
+    <p:notesMasterId r:id="rId9"/>
   </p:notesMasterIdLst>
   <p:sldIdLst>
     <p:sldId id="256" r:id="rId2"/>
@@ -13,6 +13,8 @@
     <p:sldId id="258" r:id="rId4"/>
     <p:sldId id="259" r:id="rId5"/>
     <p:sldId id="260" r:id="rId6"/>
+    <p:sldId id="261" r:id="rId7"/>
+    <p:sldId id="262" r:id="rId8"/>
   </p:sldIdLst>
   <p:sldSz cx="12192000" cy="6858000"/>
   <p:notesSz cx="6858000" cy="9144000"/>
@@ -730,6 +732,90 @@
     <p:extLst>
       <p:ext uri="{BB962C8B-B14F-4D97-AF65-F5344CB8AC3E}">
         <p14:creationId xmlns:p14="http://schemas.microsoft.com/office/powerpoint/2010/main" val="2279222941"/>
+      </p:ext>
+    </p:extLst>
+  </p:cSld>
+  <p:clrMapOvr>
+    <a:masterClrMapping/>
+  </p:clrMapOvr>
+</p:notes>
+</file>
+
+<file path=ppt/notesSlides/notesSlide4.xml><?xml version="1.0" encoding="utf-8"?>
+<p:notes xmlns:a="http://schemas.openxmlformats.org/drawingml/2006/main" xmlns:r="http://schemas.openxmlformats.org/officeDocument/2006/relationships" xmlns:p="http://schemas.openxmlformats.org/presentationml/2006/main">
+  <p:cSld>
+    <p:spTree>
+      <p:nvGrpSpPr>
+        <p:cNvPr id="1" name=""/>
+        <p:cNvGrpSpPr/>
+        <p:nvPr/>
+      </p:nvGrpSpPr>
+      <p:grpSpPr>
+        <a:xfrm>
+          <a:off x="0" y="0"/>
+          <a:ext cx="0" cy="0"/>
+          <a:chOff x="0" y="0"/>
+          <a:chExt cx="0" cy="0"/>
+        </a:xfrm>
+      </p:grpSpPr>
+      <p:sp>
+        <p:nvSpPr>
+          <p:cNvPr id="2" name="Espaço Reservado para Imagem de Slide 1"/>
+          <p:cNvSpPr>
+            <a:spLocks noGrp="1" noRot="1" noChangeAspect="1"/>
+          </p:cNvSpPr>
+          <p:nvPr>
+            <p:ph type="sldImg"/>
+          </p:nvPr>
+        </p:nvSpPr>
+        <p:spPr/>
+      </p:sp>
+      <p:sp>
+        <p:nvSpPr>
+          <p:cNvPr id="3" name="Espaço Reservado para Anotações 2"/>
+          <p:cNvSpPr>
+            <a:spLocks noGrp="1"/>
+          </p:cNvSpPr>
+          <p:nvPr>
+            <p:ph type="body" idx="1"/>
+          </p:nvPr>
+        </p:nvSpPr>
+        <p:spPr/>
+        <p:txBody>
+          <a:bodyPr/>
+          <a:lstStyle/>
+          <a:p>
+            <a:endParaRPr lang="pt-BR" dirty="0"/>
+          </a:p>
+        </p:txBody>
+      </p:sp>
+      <p:sp>
+        <p:nvSpPr>
+          <p:cNvPr id="4" name="Espaço Reservado para Número de Slide 3"/>
+          <p:cNvSpPr>
+            <a:spLocks noGrp="1"/>
+          </p:cNvSpPr>
+          <p:nvPr>
+            <p:ph type="sldNum" sz="quarter" idx="5"/>
+          </p:nvPr>
+        </p:nvSpPr>
+        <p:spPr/>
+        <p:txBody>
+          <a:bodyPr/>
+          <a:lstStyle/>
+          <a:p>
+            <a:fld id="{97F5C6F3-BB2F-4F43-8AC4-0E04693A2758}" type="slidenum">
+              <a:rPr lang="pt-BR" smtClean="0"/>
+              <a:t>7</a:t>
+            </a:fld>
+            <a:endParaRPr lang="pt-BR"/>
+          </a:p>
+        </p:txBody>
+      </p:sp>
+    </p:spTree>
+    <p:extLst>
+      <p:ext uri="{BB962C8B-B14F-4D97-AF65-F5344CB8AC3E}">
+        <p14:creationId xmlns:p14="http://schemas.microsoft.com/office/powerpoint/2010/main" val="1214298108"/>
       </p:ext>
     </p:extLst>
   </p:cSld>
@@ -4182,7 +4268,7 @@
         </p:blipFill>
         <p:spPr>
           <a:xfrm>
-            <a:off x="1875242" y="2178352"/>
+            <a:off x="3329138" y="4071160"/>
             <a:ext cx="7772400" cy="2178461"/>
           </a:xfrm>
           <a:prstGeom prst="rect">
@@ -4213,7 +4299,7 @@
         </p:blipFill>
         <p:spPr>
           <a:xfrm>
-            <a:off x="5719057" y="2482473"/>
+            <a:off x="7172953" y="4375281"/>
             <a:ext cx="1639427" cy="1228218"/>
           </a:xfrm>
           <a:prstGeom prst="rect">
@@ -4244,7 +4330,7 @@
         </p:blipFill>
         <p:spPr>
           <a:xfrm>
-            <a:off x="7591368" y="2482473"/>
+            <a:off x="9045264" y="4375281"/>
             <a:ext cx="1639427" cy="1228218"/>
           </a:xfrm>
           <a:prstGeom prst="rect">
@@ -4266,7 +4352,7 @@
         </p:nvCxnSpPr>
         <p:spPr>
           <a:xfrm>
-            <a:off x="5556738" y="2607934"/>
+            <a:off x="7010634" y="4500742"/>
             <a:ext cx="0" cy="1363484"/>
           </a:xfrm>
           <a:prstGeom prst="line">
@@ -4307,7 +4393,7 @@
         </p:nvCxnSpPr>
         <p:spPr>
           <a:xfrm>
-            <a:off x="7510885" y="2607934"/>
+            <a:off x="8964781" y="4500742"/>
             <a:ext cx="0" cy="1363484"/>
           </a:xfrm>
           <a:prstGeom prst="line">
@@ -4334,6 +4420,399 @@
           </a:fontRef>
         </p:style>
       </p:cxnSp>
+      <p:sp>
+        <p:nvSpPr>
+          <p:cNvPr id="11" name="Oval 10">
+            <a:extLst>
+              <a:ext uri="{FF2B5EF4-FFF2-40B4-BE49-F238E27FC236}">
+                <a16:creationId xmlns:a16="http://schemas.microsoft.com/office/drawing/2014/main" id="{EFB5C645-4BB0-D2F5-536F-BE988AE6609D}"/>
+              </a:ext>
+            </a:extLst>
+          </p:cNvPr>
+          <p:cNvSpPr/>
+          <p:nvPr/>
+        </p:nvSpPr>
+        <p:spPr>
+          <a:xfrm>
+            <a:off x="5723762" y="4727087"/>
+            <a:ext cx="162759" cy="107043"/>
+          </a:xfrm>
+          <a:prstGeom prst="ellipse">
+            <a:avLst/>
+          </a:prstGeom>
+          <a:solidFill>
+            <a:schemeClr val="tx1"/>
+          </a:solidFill>
+        </p:spPr>
+        <p:style>
+          <a:lnRef idx="2">
+            <a:schemeClr val="accent1">
+              <a:shade val="15000"/>
+            </a:schemeClr>
+          </a:lnRef>
+          <a:fillRef idx="1">
+            <a:schemeClr val="accent1"/>
+          </a:fillRef>
+          <a:effectRef idx="0">
+            <a:schemeClr val="accent1"/>
+          </a:effectRef>
+          <a:fontRef idx="minor">
+            <a:schemeClr val="lt1"/>
+          </a:fontRef>
+        </p:style>
+        <p:txBody>
+          <a:bodyPr rtlCol="0" anchor="ctr"/>
+          <a:lstStyle/>
+          <a:p>
+            <a:pPr algn="ctr"/>
+            <a:endParaRPr lang="pt-BR"/>
+          </a:p>
+        </p:txBody>
+      </p:sp>
+      <p:sp>
+        <p:nvSpPr>
+          <p:cNvPr id="12" name="Oval 11">
+            <a:extLst>
+              <a:ext uri="{FF2B5EF4-FFF2-40B4-BE49-F238E27FC236}">
+                <a16:creationId xmlns:a16="http://schemas.microsoft.com/office/drawing/2014/main" id="{54FE1092-40CB-02D6-3EB0-7BFC430841B9}"/>
+              </a:ext>
+            </a:extLst>
+          </p:cNvPr>
+          <p:cNvSpPr/>
+          <p:nvPr/>
+        </p:nvSpPr>
+        <p:spPr>
+          <a:xfrm>
+            <a:off x="5976530" y="5002848"/>
+            <a:ext cx="162759" cy="107043"/>
+          </a:xfrm>
+          <a:prstGeom prst="ellipse">
+            <a:avLst/>
+          </a:prstGeom>
+          <a:solidFill>
+            <a:schemeClr val="tx1"/>
+          </a:solidFill>
+        </p:spPr>
+        <p:style>
+          <a:lnRef idx="2">
+            <a:schemeClr val="accent1">
+              <a:shade val="15000"/>
+            </a:schemeClr>
+          </a:lnRef>
+          <a:fillRef idx="1">
+            <a:schemeClr val="accent1"/>
+          </a:fillRef>
+          <a:effectRef idx="0">
+            <a:schemeClr val="accent1"/>
+          </a:effectRef>
+          <a:fontRef idx="minor">
+            <a:schemeClr val="lt1"/>
+          </a:fontRef>
+        </p:style>
+        <p:txBody>
+          <a:bodyPr rtlCol="0" anchor="ctr"/>
+          <a:lstStyle/>
+          <a:p>
+            <a:pPr algn="ctr"/>
+            <a:endParaRPr lang="pt-BR"/>
+          </a:p>
+        </p:txBody>
+      </p:sp>
+      <p:sp>
+        <p:nvSpPr>
+          <p:cNvPr id="13" name="Oval 12">
+            <a:extLst>
+              <a:ext uri="{FF2B5EF4-FFF2-40B4-BE49-F238E27FC236}">
+                <a16:creationId xmlns:a16="http://schemas.microsoft.com/office/drawing/2014/main" id="{C3112A28-28C4-6EEE-AEFD-A7AC56CD2F59}"/>
+              </a:ext>
+            </a:extLst>
+          </p:cNvPr>
+          <p:cNvSpPr/>
+          <p:nvPr/>
+        </p:nvSpPr>
+        <p:spPr>
+          <a:xfrm>
+            <a:off x="6226322" y="5214765"/>
+            <a:ext cx="162759" cy="107043"/>
+          </a:xfrm>
+          <a:prstGeom prst="ellipse">
+            <a:avLst/>
+          </a:prstGeom>
+          <a:solidFill>
+            <a:schemeClr val="tx1"/>
+          </a:solidFill>
+        </p:spPr>
+        <p:style>
+          <a:lnRef idx="2">
+            <a:schemeClr val="accent1">
+              <a:shade val="15000"/>
+            </a:schemeClr>
+          </a:lnRef>
+          <a:fillRef idx="1">
+            <a:schemeClr val="accent1"/>
+          </a:fillRef>
+          <a:effectRef idx="0">
+            <a:schemeClr val="accent1"/>
+          </a:effectRef>
+          <a:fontRef idx="minor">
+            <a:schemeClr val="lt1"/>
+          </a:fontRef>
+        </p:style>
+        <p:txBody>
+          <a:bodyPr rtlCol="0" anchor="ctr"/>
+          <a:lstStyle/>
+          <a:p>
+            <a:pPr algn="ctr"/>
+            <a:endParaRPr lang="pt-BR"/>
+          </a:p>
+        </p:txBody>
+      </p:sp>
+      <p:pic>
+        <p:nvPicPr>
+          <p:cNvPr id="14" name="Imagem 13">
+            <a:extLst>
+              <a:ext uri="{FF2B5EF4-FFF2-40B4-BE49-F238E27FC236}">
+                <a16:creationId xmlns:a16="http://schemas.microsoft.com/office/drawing/2014/main" id="{CFFEE864-766A-B836-143F-75E9CC226D39}"/>
+              </a:ext>
+            </a:extLst>
+          </p:cNvPr>
+          <p:cNvPicPr>
+            <a:picLocks noChangeAspect="1"/>
+          </p:cNvPicPr>
+          <p:nvPr/>
+        </p:nvPicPr>
+        <p:blipFill>
+          <a:blip r:embed="rId3"/>
+          <a:stretch>
+            <a:fillRect/>
+          </a:stretch>
+        </p:blipFill>
+        <p:spPr>
+          <a:xfrm>
+            <a:off x="1837562" y="545061"/>
+            <a:ext cx="7772400" cy="2110608"/>
+          </a:xfrm>
+          <a:prstGeom prst="rect">
+            <a:avLst/>
+          </a:prstGeom>
+        </p:spPr>
+      </p:pic>
+      <p:sp>
+        <p:nvSpPr>
+          <p:cNvPr id="15" name="Oval 14">
+            <a:extLst>
+              <a:ext uri="{FF2B5EF4-FFF2-40B4-BE49-F238E27FC236}">
+                <a16:creationId xmlns:a16="http://schemas.microsoft.com/office/drawing/2014/main" id="{4A5CA5D5-9E78-EC53-F429-77B36DE807EB}"/>
+              </a:ext>
+            </a:extLst>
+          </p:cNvPr>
+          <p:cNvSpPr/>
+          <p:nvPr/>
+        </p:nvSpPr>
+        <p:spPr>
+          <a:xfrm>
+            <a:off x="3691128" y="2330627"/>
+            <a:ext cx="201168" cy="201168"/>
+          </a:xfrm>
+          <a:prstGeom prst="ellipse">
+            <a:avLst/>
+          </a:prstGeom>
+          <a:solidFill>
+            <a:schemeClr val="tx1"/>
+          </a:solidFill>
+          <a:ln w="104775" cmpd="dbl">
+            <a:solidFill>
+              <a:schemeClr val="bg1"/>
+            </a:solidFill>
+          </a:ln>
+        </p:spPr>
+        <p:style>
+          <a:lnRef idx="2">
+            <a:schemeClr val="accent1">
+              <a:shade val="15000"/>
+            </a:schemeClr>
+          </a:lnRef>
+          <a:fillRef idx="1">
+            <a:schemeClr val="accent1"/>
+          </a:fillRef>
+          <a:effectRef idx="0">
+            <a:schemeClr val="accent1"/>
+          </a:effectRef>
+          <a:fontRef idx="minor">
+            <a:schemeClr val="lt1"/>
+          </a:fontRef>
+        </p:style>
+        <p:txBody>
+          <a:bodyPr rtlCol="0" anchor="ctr"/>
+          <a:lstStyle/>
+          <a:p>
+            <a:pPr algn="ctr"/>
+            <a:endParaRPr lang="pt-BR"/>
+          </a:p>
+        </p:txBody>
+      </p:sp>
+      <p:sp>
+        <p:nvSpPr>
+          <p:cNvPr id="16" name="Oval 15">
+            <a:extLst>
+              <a:ext uri="{FF2B5EF4-FFF2-40B4-BE49-F238E27FC236}">
+                <a16:creationId xmlns:a16="http://schemas.microsoft.com/office/drawing/2014/main" id="{7829891D-62EB-7C72-0EAC-7D99E8FD59B1}"/>
+              </a:ext>
+            </a:extLst>
+          </p:cNvPr>
+          <p:cNvSpPr/>
+          <p:nvPr/>
+        </p:nvSpPr>
+        <p:spPr>
+          <a:xfrm>
+            <a:off x="9244584" y="687629"/>
+            <a:ext cx="201168" cy="201168"/>
+          </a:xfrm>
+          <a:prstGeom prst="ellipse">
+            <a:avLst/>
+          </a:prstGeom>
+          <a:solidFill>
+            <a:schemeClr val="tx1"/>
+          </a:solidFill>
+          <a:ln w="104775" cmpd="dbl">
+            <a:solidFill>
+              <a:schemeClr val="bg1"/>
+            </a:solidFill>
+          </a:ln>
+        </p:spPr>
+        <p:style>
+          <a:lnRef idx="2">
+            <a:schemeClr val="accent1">
+              <a:shade val="15000"/>
+            </a:schemeClr>
+          </a:lnRef>
+          <a:fillRef idx="1">
+            <a:schemeClr val="accent1"/>
+          </a:fillRef>
+          <a:effectRef idx="0">
+            <a:schemeClr val="accent1"/>
+          </a:effectRef>
+          <a:fontRef idx="minor">
+            <a:schemeClr val="lt1"/>
+          </a:fontRef>
+        </p:style>
+        <p:txBody>
+          <a:bodyPr rtlCol="0" anchor="ctr"/>
+          <a:lstStyle/>
+          <a:p>
+            <a:pPr algn="ctr"/>
+            <a:endParaRPr lang="pt-BR"/>
+          </a:p>
+        </p:txBody>
+      </p:sp>
+      <p:sp>
+        <p:nvSpPr>
+          <p:cNvPr id="17" name="Oval 16">
+            <a:extLst>
+              <a:ext uri="{FF2B5EF4-FFF2-40B4-BE49-F238E27FC236}">
+                <a16:creationId xmlns:a16="http://schemas.microsoft.com/office/drawing/2014/main" id="{74557D96-3EC6-6F65-B523-E223FD370A51}"/>
+              </a:ext>
+            </a:extLst>
+          </p:cNvPr>
+          <p:cNvSpPr/>
+          <p:nvPr/>
+        </p:nvSpPr>
+        <p:spPr>
+          <a:xfrm>
+            <a:off x="3688080" y="699821"/>
+            <a:ext cx="201168" cy="201168"/>
+          </a:xfrm>
+          <a:prstGeom prst="ellipse">
+            <a:avLst/>
+          </a:prstGeom>
+          <a:solidFill>
+            <a:schemeClr val="tx1"/>
+          </a:solidFill>
+          <a:ln w="104775" cmpd="dbl">
+            <a:solidFill>
+              <a:schemeClr val="bg1"/>
+            </a:solidFill>
+          </a:ln>
+        </p:spPr>
+        <p:style>
+          <a:lnRef idx="2">
+            <a:schemeClr val="accent1">
+              <a:shade val="15000"/>
+            </a:schemeClr>
+          </a:lnRef>
+          <a:fillRef idx="1">
+            <a:schemeClr val="accent1"/>
+          </a:fillRef>
+          <a:effectRef idx="0">
+            <a:schemeClr val="accent1"/>
+          </a:effectRef>
+          <a:fontRef idx="minor">
+            <a:schemeClr val="lt1"/>
+          </a:fontRef>
+        </p:style>
+        <p:txBody>
+          <a:bodyPr rtlCol="0" anchor="ctr"/>
+          <a:lstStyle/>
+          <a:p>
+            <a:pPr algn="ctr"/>
+            <a:endParaRPr lang="pt-BR"/>
+          </a:p>
+        </p:txBody>
+      </p:sp>
+      <p:sp>
+        <p:nvSpPr>
+          <p:cNvPr id="18" name="Oval 17">
+            <a:extLst>
+              <a:ext uri="{FF2B5EF4-FFF2-40B4-BE49-F238E27FC236}">
+                <a16:creationId xmlns:a16="http://schemas.microsoft.com/office/drawing/2014/main" id="{898F5612-0BB2-E2FA-24F2-C9A2DFACBFB6}"/>
+              </a:ext>
+            </a:extLst>
+          </p:cNvPr>
+          <p:cNvSpPr/>
+          <p:nvPr/>
+        </p:nvSpPr>
+        <p:spPr>
+          <a:xfrm>
+            <a:off x="9244584" y="2330627"/>
+            <a:ext cx="201168" cy="201168"/>
+          </a:xfrm>
+          <a:prstGeom prst="ellipse">
+            <a:avLst/>
+          </a:prstGeom>
+          <a:solidFill>
+            <a:schemeClr val="tx1"/>
+          </a:solidFill>
+          <a:ln w="104775" cmpd="dbl">
+            <a:solidFill>
+              <a:schemeClr val="bg1"/>
+            </a:solidFill>
+          </a:ln>
+        </p:spPr>
+        <p:style>
+          <a:lnRef idx="2">
+            <a:schemeClr val="accent1">
+              <a:shade val="15000"/>
+            </a:schemeClr>
+          </a:lnRef>
+          <a:fillRef idx="1">
+            <a:schemeClr val="accent1"/>
+          </a:fillRef>
+          <a:effectRef idx="0">
+            <a:schemeClr val="accent1"/>
+          </a:effectRef>
+          <a:fontRef idx="minor">
+            <a:schemeClr val="lt1"/>
+          </a:fontRef>
+        </p:style>
+        <p:txBody>
+          <a:bodyPr rtlCol="0" anchor="ctr"/>
+          <a:lstStyle/>
+          <a:p>
+            <a:pPr algn="ctr"/>
+            <a:endParaRPr lang="pt-BR"/>
+          </a:p>
+        </p:txBody>
+      </p:sp>
     </p:spTree>
     <p:extLst>
       <p:ext uri="{BB962C8B-B14F-4D97-AF65-F5344CB8AC3E}">
@@ -5087,8 +5566,312 @@
         </p:blipFill>
         <p:spPr>
           <a:xfrm>
-            <a:off x="884701" y="585216"/>
+            <a:off x="811549" y="457397"/>
             <a:ext cx="2752344" cy="3072384"/>
+          </a:xfrm>
+          <a:prstGeom prst="rect">
+            <a:avLst/>
+          </a:prstGeom>
+        </p:spPr>
+      </p:pic>
+      <p:sp>
+        <p:nvSpPr>
+          <p:cNvPr id="3" name="CaixaDeTexto 2">
+            <a:extLst>
+              <a:ext uri="{FF2B5EF4-FFF2-40B4-BE49-F238E27FC236}">
+                <a16:creationId xmlns:a16="http://schemas.microsoft.com/office/drawing/2014/main" id="{2C78337E-36B1-FCA9-A5FD-902CF1A40333}"/>
+              </a:ext>
+            </a:extLst>
+          </p:cNvPr>
+          <p:cNvSpPr txBox="1"/>
+          <p:nvPr/>
+        </p:nvSpPr>
+        <p:spPr>
+          <a:xfrm>
+            <a:off x="5022342" y="457397"/>
+            <a:ext cx="6094476" cy="5632311"/>
+          </a:xfrm>
+          <a:prstGeom prst="rect">
+            <a:avLst/>
+          </a:prstGeom>
+          <a:noFill/>
+        </p:spPr>
+        <p:txBody>
+          <a:bodyPr wrap="square">
+            <a:spAutoFit/>
+          </a:bodyPr>
+          <a:lstStyle/>
+          <a:p>
+            <a:pPr>
+              <a:buNone/>
+            </a:pPr>
+            <a:r>
+              <a:rPr lang="pt-BR" b="1" dirty="0"/>
+              <a:t>Paleta de Cores - </a:t>
+            </a:r>
+            <a:r>
+              <a:rPr lang="pt-BR" b="1" dirty="0" err="1"/>
+              <a:t>TestifyAi</a:t>
+            </a:r>
+            <a:endParaRPr lang="pt-BR" b="1" dirty="0"/>
+          </a:p>
+          <a:p>
+            <a:pPr>
+              <a:buNone/>
+            </a:pPr>
+            <a:r>
+              <a:rPr lang="pt-BR" b="1" dirty="0"/>
+              <a:t>1. Índigo Escuro (para o texto "</a:t>
+            </a:r>
+            <a:r>
+              <a:rPr lang="pt-BR" b="1" dirty="0" err="1"/>
+              <a:t>Testify</a:t>
+            </a:r>
+            <a:r>
+              <a:rPr lang="pt-BR" b="1" dirty="0"/>
+              <a:t>")</a:t>
+            </a:r>
+          </a:p>
+          <a:p>
+            <a:pPr>
+              <a:buNone/>
+            </a:pPr>
+            <a:r>
+              <a:rPr lang="pt-BR" dirty="0"/>
+              <a:t>Cor sólida e escura para dar contraste e legibilidade.</a:t>
+            </a:r>
+          </a:p>
+          <a:p>
+            <a:pPr>
+              <a:buFont typeface="Arial" panose="020B0604020202020204" pitchFamily="34" charset="0"/>
+              <a:buChar char="•"/>
+            </a:pPr>
+            <a:r>
+              <a:rPr lang="pt-BR" b="1" dirty="0"/>
+              <a:t>HEX:</a:t>
+            </a:r>
+            <a:r>
+              <a:rPr lang="pt-BR" dirty="0"/>
+              <a:t> #3A2E7A</a:t>
+            </a:r>
+          </a:p>
+          <a:p>
+            <a:pPr>
+              <a:buFont typeface="Arial" panose="020B0604020202020204" pitchFamily="34" charset="0"/>
+              <a:buChar char="•"/>
+            </a:pPr>
+            <a:r>
+              <a:rPr lang="pt-BR" b="1" dirty="0"/>
+              <a:t>RGB:</a:t>
+            </a:r>
+            <a:r>
+              <a:rPr lang="pt-BR" dirty="0"/>
+              <a:t> (58, 46, 122)</a:t>
+            </a:r>
+          </a:p>
+          <a:p>
+            <a:pPr>
+              <a:buNone/>
+            </a:pPr>
+            <a:r>
+              <a:rPr lang="pt-BR" b="1" dirty="0"/>
+              <a:t>2. Índigo Profundo (Início do gradiente)</a:t>
+            </a:r>
+          </a:p>
+          <a:p>
+            <a:pPr>
+              <a:buNone/>
+            </a:pPr>
+            <a:r>
+              <a:rPr lang="pt-BR" dirty="0"/>
+              <a:t>A cor mais escura na letra "A" e no lápis, representa conhecimento.</a:t>
+            </a:r>
+          </a:p>
+          <a:p>
+            <a:pPr>
+              <a:buFont typeface="Arial" panose="020B0604020202020204" pitchFamily="34" charset="0"/>
+              <a:buChar char="•"/>
+            </a:pPr>
+            <a:r>
+              <a:rPr lang="pt-BR" b="1" dirty="0"/>
+              <a:t>HEX:</a:t>
+            </a:r>
+            <a:r>
+              <a:rPr lang="pt-BR" dirty="0"/>
+              <a:t> #4B0082</a:t>
+            </a:r>
+          </a:p>
+          <a:p>
+            <a:pPr>
+              <a:buFont typeface="Arial" panose="020B0604020202020204" pitchFamily="34" charset="0"/>
+              <a:buChar char="•"/>
+            </a:pPr>
+            <a:r>
+              <a:rPr lang="pt-BR" b="1" dirty="0"/>
+              <a:t>RGB:</a:t>
+            </a:r>
+            <a:r>
+              <a:rPr lang="pt-BR" dirty="0"/>
+              <a:t> (75, 0, 130)</a:t>
+            </a:r>
+          </a:p>
+          <a:p>
+            <a:pPr>
+              <a:buNone/>
+            </a:pPr>
+            <a:r>
+              <a:rPr lang="pt-BR" b="1" dirty="0"/>
+              <a:t>3. Azul Intermediário (Meio do gradiente)</a:t>
+            </a:r>
+          </a:p>
+          <a:p>
+            <a:pPr>
+              <a:buNone/>
+            </a:pPr>
+            <a:r>
+              <a:rPr lang="pt-BR" dirty="0"/>
+              <a:t>A cor de transição que cria o efeito de profundidade e modernidade.</a:t>
+            </a:r>
+          </a:p>
+          <a:p>
+            <a:pPr>
+              <a:buFont typeface="Arial" panose="020B0604020202020204" pitchFamily="34" charset="0"/>
+              <a:buChar char="•"/>
+            </a:pPr>
+            <a:r>
+              <a:rPr lang="pt-BR" b="1" dirty="0"/>
+              <a:t>HEX:</a:t>
+            </a:r>
+            <a:r>
+              <a:rPr lang="pt-BR" dirty="0"/>
+              <a:t> #4858A3</a:t>
+            </a:r>
+          </a:p>
+          <a:p>
+            <a:pPr>
+              <a:buFont typeface="Arial" panose="020B0604020202020204" pitchFamily="34" charset="0"/>
+              <a:buChar char="•"/>
+            </a:pPr>
+            <a:r>
+              <a:rPr lang="pt-BR" b="1" dirty="0"/>
+              <a:t>RGB:</a:t>
+            </a:r>
+            <a:r>
+              <a:rPr lang="pt-BR" dirty="0"/>
+              <a:t> (72, 88, 163)</a:t>
+            </a:r>
+          </a:p>
+          <a:p>
+            <a:pPr>
+              <a:buNone/>
+            </a:pPr>
+            <a:r>
+              <a:rPr lang="pt-BR" b="1" dirty="0"/>
+              <a:t>4. Ciano / </a:t>
+            </a:r>
+            <a:r>
+              <a:rPr lang="pt-BR" b="1" dirty="0" err="1"/>
+              <a:t>Verde-azulado</a:t>
+            </a:r>
+            <a:r>
+              <a:rPr lang="pt-BR" b="1" dirty="0"/>
+              <a:t> (Fim do gradiente e texto "AI")</a:t>
+            </a:r>
+          </a:p>
+          <a:p>
+            <a:pPr>
+              <a:buNone/>
+            </a:pPr>
+            <a:r>
+              <a:rPr lang="pt-BR" dirty="0"/>
+              <a:t>A cor mais clara e vibrante, simbolizando tecnologia, sucesso e inteligência.</a:t>
+            </a:r>
+          </a:p>
+          <a:p>
+            <a:pPr>
+              <a:buFont typeface="Arial" panose="020B0604020202020204" pitchFamily="34" charset="0"/>
+              <a:buChar char="•"/>
+            </a:pPr>
+            <a:r>
+              <a:rPr lang="pt-BR" b="1" dirty="0"/>
+              <a:t>HEX:</a:t>
+            </a:r>
+            <a:r>
+              <a:rPr lang="pt-BR" dirty="0"/>
+              <a:t> #20B2AA</a:t>
+            </a:r>
+          </a:p>
+          <a:p>
+            <a:pPr>
+              <a:buFont typeface="Arial" panose="020B0604020202020204" pitchFamily="34" charset="0"/>
+              <a:buChar char="•"/>
+            </a:pPr>
+            <a:r>
+              <a:rPr lang="pt-BR" b="1" dirty="0"/>
+              <a:t>RGB:</a:t>
+            </a:r>
+            <a:r>
+              <a:rPr lang="pt-BR" dirty="0"/>
+              <a:t> (32, 178, 170)</a:t>
+            </a:r>
+          </a:p>
+        </p:txBody>
+      </p:sp>
+      <p:pic>
+        <p:nvPicPr>
+          <p:cNvPr id="15" name="Imagem 14" descr="Uma imagem contendo Padrão do plano de fundo&#10;&#10;O conteúdo gerado por IA pode estar incorreto.">
+            <a:extLst>
+              <a:ext uri="{FF2B5EF4-FFF2-40B4-BE49-F238E27FC236}">
+                <a16:creationId xmlns:a16="http://schemas.microsoft.com/office/drawing/2014/main" id="{08FDE006-A43A-1687-AA3A-D88DD516CBA8}"/>
+              </a:ext>
+            </a:extLst>
+          </p:cNvPr>
+          <p:cNvPicPr>
+            <a:picLocks noChangeAspect="1"/>
+          </p:cNvPicPr>
+          <p:nvPr/>
+        </p:nvPicPr>
+        <p:blipFill>
+          <a:blip r:embed="rId4"/>
+          <a:stretch>
+            <a:fillRect/>
+          </a:stretch>
+        </p:blipFill>
+        <p:spPr>
+          <a:xfrm>
+            <a:off x="89173" y="3574438"/>
+            <a:ext cx="4572000" cy="3136900"/>
+          </a:xfrm>
+          <a:prstGeom prst="rect">
+            <a:avLst/>
+          </a:prstGeom>
+        </p:spPr>
+      </p:pic>
+      <p:pic>
+        <p:nvPicPr>
+          <p:cNvPr id="17" name="Imagem 16" descr="Logotipo, nome da empresa&#10;&#10;O conteúdo gerado por IA pode estar incorreto.">
+            <a:extLst>
+              <a:ext uri="{FF2B5EF4-FFF2-40B4-BE49-F238E27FC236}">
+                <a16:creationId xmlns:a16="http://schemas.microsoft.com/office/drawing/2014/main" id="{BE241AA0-5840-0E8D-ECF9-A5371A1D9AB5}"/>
+              </a:ext>
+            </a:extLst>
+          </p:cNvPr>
+          <p:cNvPicPr>
+            <a:picLocks noChangeAspect="1"/>
+          </p:cNvPicPr>
+          <p:nvPr/>
+        </p:nvPicPr>
+        <p:blipFill>
+          <a:blip r:embed="rId3"/>
+          <a:srcRect l="26544" t="21769" r="29468" b="39827"/>
+          <a:stretch>
+            <a:fillRect/>
+          </a:stretch>
+        </p:blipFill>
+        <p:spPr>
+          <a:xfrm>
+            <a:off x="8860535" y="457397"/>
+            <a:ext cx="2450593" cy="2139499"/>
           </a:xfrm>
           <a:prstGeom prst="rect">
             <a:avLst/>
@@ -5099,6 +5882,600 @@
     <p:extLst>
       <p:ext uri="{BB962C8B-B14F-4D97-AF65-F5344CB8AC3E}">
         <p14:creationId xmlns:p14="http://schemas.microsoft.com/office/powerpoint/2010/main" val="3580150475"/>
+      </p:ext>
+    </p:extLst>
+  </p:cSld>
+  <p:clrMapOvr>
+    <a:masterClrMapping/>
+  </p:clrMapOvr>
+</p:sld>
+</file>
+
+<file path=ppt/slides/slide6.xml><?xml version="1.0" encoding="utf-8"?>
+<p:sld xmlns:a="http://schemas.openxmlformats.org/drawingml/2006/main" xmlns:r="http://schemas.openxmlformats.org/officeDocument/2006/relationships" xmlns:p="http://schemas.openxmlformats.org/presentationml/2006/main">
+  <p:cSld>
+    <p:spTree>
+      <p:nvGrpSpPr>
+        <p:cNvPr id="1" name=""/>
+        <p:cNvGrpSpPr/>
+        <p:nvPr/>
+      </p:nvGrpSpPr>
+      <p:grpSpPr>
+        <a:xfrm>
+          <a:off x="0" y="0"/>
+          <a:ext cx="0" cy="0"/>
+          <a:chOff x="0" y="0"/>
+          <a:chExt cx="0" cy="0"/>
+        </a:xfrm>
+      </p:grpSpPr>
+      <p:pic>
+        <p:nvPicPr>
+          <p:cNvPr id="2" name="Imagem 1" descr="Logotipo, nome da empresa&#10;&#10;O conteúdo gerado por IA pode estar incorreto.">
+            <a:extLst>
+              <a:ext uri="{FF2B5EF4-FFF2-40B4-BE49-F238E27FC236}">
+                <a16:creationId xmlns:a16="http://schemas.microsoft.com/office/drawing/2014/main" id="{5F2F277D-6B50-F603-C296-C211879F5F08}"/>
+              </a:ext>
+            </a:extLst>
+          </p:cNvPr>
+          <p:cNvPicPr>
+            <a:picLocks noChangeAspect="1"/>
+          </p:cNvPicPr>
+          <p:nvPr/>
+        </p:nvPicPr>
+        <p:blipFill>
+          <a:blip r:embed="rId2">
+            <a:clrChange>
+              <a:clrFrom>
+                <a:srgbClr val="FFFFFF"/>
+              </a:clrFrom>
+              <a:clrTo>
+                <a:srgbClr val="FFFFFF">
+                  <a:alpha val="0"/>
+                </a:srgbClr>
+              </a:clrTo>
+            </a:clrChange>
+          </a:blip>
+          <a:srcRect l="26544" t="21769" r="29468" b="39827"/>
+          <a:stretch>
+            <a:fillRect/>
+          </a:stretch>
+        </p:blipFill>
+        <p:spPr>
+          <a:xfrm>
+            <a:off x="1560575" y="1435805"/>
+            <a:ext cx="2104965" cy="1837747"/>
+          </a:xfrm>
+          <a:prstGeom prst="rect">
+            <a:avLst/>
+          </a:prstGeom>
+        </p:spPr>
+      </p:pic>
+    </p:spTree>
+    <p:extLst>
+      <p:ext uri="{BB962C8B-B14F-4D97-AF65-F5344CB8AC3E}">
+        <p14:creationId xmlns:p14="http://schemas.microsoft.com/office/powerpoint/2010/main" val="2730458493"/>
+      </p:ext>
+    </p:extLst>
+  </p:cSld>
+  <p:clrMapOvr>
+    <a:masterClrMapping/>
+  </p:clrMapOvr>
+</p:sld>
+</file>
+
+<file path=ppt/slides/slide7.xml><?xml version="1.0" encoding="utf-8"?>
+<p:sld xmlns:a="http://schemas.openxmlformats.org/drawingml/2006/main" xmlns:r="http://schemas.openxmlformats.org/officeDocument/2006/relationships" xmlns:p="http://schemas.openxmlformats.org/presentationml/2006/main">
+  <p:cSld>
+    <p:spTree>
+      <p:nvGrpSpPr>
+        <p:cNvPr id="1" name="">
+          <a:extLst>
+            <a:ext uri="{FF2B5EF4-FFF2-40B4-BE49-F238E27FC236}">
+              <a16:creationId xmlns:a16="http://schemas.microsoft.com/office/drawing/2014/main" id="{CE2F2884-7283-DA93-B8A3-927DEA7CB9B3}"/>
+            </a:ext>
+          </a:extLst>
+        </p:cNvPr>
+        <p:cNvGrpSpPr/>
+        <p:nvPr/>
+      </p:nvGrpSpPr>
+      <p:grpSpPr>
+        <a:xfrm>
+          <a:off x="0" y="0"/>
+          <a:ext cx="0" cy="0"/>
+          <a:chOff x="0" y="0"/>
+          <a:chExt cx="0" cy="0"/>
+        </a:xfrm>
+      </p:grpSpPr>
+      <p:pic>
+        <p:nvPicPr>
+          <p:cNvPr id="3" name="Imagem 2">
+            <a:extLst>
+              <a:ext uri="{FF2B5EF4-FFF2-40B4-BE49-F238E27FC236}">
+                <a16:creationId xmlns:a16="http://schemas.microsoft.com/office/drawing/2014/main" id="{F1D3AEB6-7B6C-1BCD-910E-140A571289FD}"/>
+              </a:ext>
+            </a:extLst>
+          </p:cNvPr>
+          <p:cNvPicPr>
+            <a:picLocks noChangeAspect="1"/>
+          </p:cNvPicPr>
+          <p:nvPr/>
+        </p:nvPicPr>
+        <p:blipFill>
+          <a:blip r:embed="rId3"/>
+          <a:stretch>
+            <a:fillRect/>
+          </a:stretch>
+        </p:blipFill>
+        <p:spPr>
+          <a:xfrm>
+            <a:off x="1121664" y="1106259"/>
+            <a:ext cx="7772400" cy="2972129"/>
+          </a:xfrm>
+          <a:prstGeom prst="rect">
+            <a:avLst/>
+          </a:prstGeom>
+        </p:spPr>
+      </p:pic>
+      <p:sp>
+        <p:nvSpPr>
+          <p:cNvPr id="4" name="Oval 3">
+            <a:extLst>
+              <a:ext uri="{FF2B5EF4-FFF2-40B4-BE49-F238E27FC236}">
+                <a16:creationId xmlns:a16="http://schemas.microsoft.com/office/drawing/2014/main" id="{10183709-9E81-EE5F-4F2F-1476949CCFA8}"/>
+              </a:ext>
+            </a:extLst>
+          </p:cNvPr>
+          <p:cNvSpPr/>
+          <p:nvPr/>
+        </p:nvSpPr>
+        <p:spPr>
+          <a:xfrm>
+            <a:off x="3108960" y="2768510"/>
+            <a:ext cx="490728" cy="338328"/>
+          </a:xfrm>
+          <a:prstGeom prst="ellipse">
+            <a:avLst/>
+          </a:prstGeom>
+          <a:noFill/>
+          <a:ln w="28575">
+            <a:solidFill>
+              <a:srgbClr val="C00000"/>
+            </a:solidFill>
+          </a:ln>
+        </p:spPr>
+        <p:style>
+          <a:lnRef idx="2">
+            <a:schemeClr val="accent1">
+              <a:shade val="15000"/>
+            </a:schemeClr>
+          </a:lnRef>
+          <a:fillRef idx="1">
+            <a:schemeClr val="accent1"/>
+          </a:fillRef>
+          <a:effectRef idx="0">
+            <a:schemeClr val="accent1"/>
+          </a:effectRef>
+          <a:fontRef idx="minor">
+            <a:schemeClr val="lt1"/>
+          </a:fontRef>
+        </p:style>
+        <p:txBody>
+          <a:bodyPr rtlCol="0" anchor="ctr"/>
+          <a:lstStyle/>
+          <a:p>
+            <a:pPr algn="ctr"/>
+            <a:endParaRPr lang="pt-BR"/>
+          </a:p>
+        </p:txBody>
+      </p:sp>
+      <p:sp>
+        <p:nvSpPr>
+          <p:cNvPr id="5" name="Oval 4">
+            <a:extLst>
+              <a:ext uri="{FF2B5EF4-FFF2-40B4-BE49-F238E27FC236}">
+                <a16:creationId xmlns:a16="http://schemas.microsoft.com/office/drawing/2014/main" id="{142CE077-6E64-C346-A3F1-EDF25626614E}"/>
+              </a:ext>
+            </a:extLst>
+          </p:cNvPr>
+          <p:cNvSpPr/>
+          <p:nvPr/>
+        </p:nvSpPr>
+        <p:spPr>
+          <a:xfrm>
+            <a:off x="3008376" y="1536192"/>
+            <a:ext cx="490728" cy="338328"/>
+          </a:xfrm>
+          <a:prstGeom prst="ellipse">
+            <a:avLst/>
+          </a:prstGeom>
+          <a:noFill/>
+          <a:ln w="28575">
+            <a:solidFill>
+              <a:srgbClr val="C00000"/>
+            </a:solidFill>
+          </a:ln>
+        </p:spPr>
+        <p:style>
+          <a:lnRef idx="2">
+            <a:schemeClr val="accent1">
+              <a:shade val="15000"/>
+            </a:schemeClr>
+          </a:lnRef>
+          <a:fillRef idx="1">
+            <a:schemeClr val="accent1"/>
+          </a:fillRef>
+          <a:effectRef idx="0">
+            <a:schemeClr val="accent1"/>
+          </a:effectRef>
+          <a:fontRef idx="minor">
+            <a:schemeClr val="lt1"/>
+          </a:fontRef>
+        </p:style>
+        <p:txBody>
+          <a:bodyPr rtlCol="0" anchor="ctr"/>
+          <a:lstStyle/>
+          <a:p>
+            <a:pPr algn="ctr"/>
+            <a:endParaRPr lang="pt-BR"/>
+          </a:p>
+        </p:txBody>
+      </p:sp>
+      <p:sp>
+        <p:nvSpPr>
+          <p:cNvPr id="6" name="Oval 5">
+            <a:extLst>
+              <a:ext uri="{FF2B5EF4-FFF2-40B4-BE49-F238E27FC236}">
+                <a16:creationId xmlns:a16="http://schemas.microsoft.com/office/drawing/2014/main" id="{78E77122-D3F2-5FEE-A9E1-196D7724B36A}"/>
+              </a:ext>
+            </a:extLst>
+          </p:cNvPr>
+          <p:cNvSpPr/>
+          <p:nvPr/>
+        </p:nvSpPr>
+        <p:spPr>
+          <a:xfrm>
+            <a:off x="3008376" y="2135289"/>
+            <a:ext cx="490728" cy="338328"/>
+          </a:xfrm>
+          <a:prstGeom prst="ellipse">
+            <a:avLst/>
+          </a:prstGeom>
+          <a:noFill/>
+          <a:ln w="28575">
+            <a:solidFill>
+              <a:srgbClr val="C00000"/>
+            </a:solidFill>
+          </a:ln>
+        </p:spPr>
+        <p:style>
+          <a:lnRef idx="2">
+            <a:schemeClr val="accent1">
+              <a:shade val="15000"/>
+            </a:schemeClr>
+          </a:lnRef>
+          <a:fillRef idx="1">
+            <a:schemeClr val="accent1"/>
+          </a:fillRef>
+          <a:effectRef idx="0">
+            <a:schemeClr val="accent1"/>
+          </a:effectRef>
+          <a:fontRef idx="minor">
+            <a:schemeClr val="lt1"/>
+          </a:fontRef>
+        </p:style>
+        <p:txBody>
+          <a:bodyPr rtlCol="0" anchor="ctr"/>
+          <a:lstStyle/>
+          <a:p>
+            <a:pPr algn="ctr"/>
+            <a:endParaRPr lang="pt-BR"/>
+          </a:p>
+        </p:txBody>
+      </p:sp>
+      <p:pic>
+        <p:nvPicPr>
+          <p:cNvPr id="8" name="Imagem 7">
+            <a:extLst>
+              <a:ext uri="{FF2B5EF4-FFF2-40B4-BE49-F238E27FC236}">
+                <a16:creationId xmlns:a16="http://schemas.microsoft.com/office/drawing/2014/main" id="{DB21CFF8-44FE-2FE4-CF44-836A36D6486E}"/>
+              </a:ext>
+            </a:extLst>
+          </p:cNvPr>
+          <p:cNvPicPr>
+            <a:picLocks noChangeAspect="1"/>
+          </p:cNvPicPr>
+          <p:nvPr/>
+        </p:nvPicPr>
+        <p:blipFill>
+          <a:blip r:embed="rId4"/>
+          <a:stretch>
+            <a:fillRect/>
+          </a:stretch>
+        </p:blipFill>
+        <p:spPr>
+          <a:xfrm>
+            <a:off x="4002024" y="1874520"/>
+            <a:ext cx="7772400" cy="4272246"/>
+          </a:xfrm>
+          <a:prstGeom prst="rect">
+            <a:avLst/>
+          </a:prstGeom>
+        </p:spPr>
+      </p:pic>
+      <p:sp>
+        <p:nvSpPr>
+          <p:cNvPr id="9" name="Oval 8">
+            <a:extLst>
+              <a:ext uri="{FF2B5EF4-FFF2-40B4-BE49-F238E27FC236}">
+                <a16:creationId xmlns:a16="http://schemas.microsoft.com/office/drawing/2014/main" id="{39CA0D14-5540-E48C-7317-8759FC9AAB5B}"/>
+              </a:ext>
+            </a:extLst>
+          </p:cNvPr>
+          <p:cNvSpPr/>
+          <p:nvPr/>
+        </p:nvSpPr>
+        <p:spPr>
+          <a:xfrm>
+            <a:off x="8738616" y="3227832"/>
+            <a:ext cx="155448" cy="128016"/>
+          </a:xfrm>
+          <a:prstGeom prst="ellipse">
+            <a:avLst/>
+          </a:prstGeom>
+          <a:solidFill>
+            <a:schemeClr val="bg2">
+              <a:lumMod val="50000"/>
+            </a:schemeClr>
+          </a:solidFill>
+          <a:ln>
+            <a:noFill/>
+          </a:ln>
+        </p:spPr>
+        <p:style>
+          <a:lnRef idx="2">
+            <a:schemeClr val="accent1">
+              <a:shade val="15000"/>
+            </a:schemeClr>
+          </a:lnRef>
+          <a:fillRef idx="1">
+            <a:schemeClr val="accent1"/>
+          </a:fillRef>
+          <a:effectRef idx="0">
+            <a:schemeClr val="accent1"/>
+          </a:effectRef>
+          <a:fontRef idx="minor">
+            <a:schemeClr val="lt1"/>
+          </a:fontRef>
+        </p:style>
+        <p:txBody>
+          <a:bodyPr rtlCol="0" anchor="ctr"/>
+          <a:lstStyle/>
+          <a:p>
+            <a:pPr algn="ctr"/>
+            <a:endParaRPr lang="pt-BR"/>
+          </a:p>
+        </p:txBody>
+      </p:sp>
+      <p:sp>
+        <p:nvSpPr>
+          <p:cNvPr id="10" name="Oval 9">
+            <a:extLst>
+              <a:ext uri="{FF2B5EF4-FFF2-40B4-BE49-F238E27FC236}">
+                <a16:creationId xmlns:a16="http://schemas.microsoft.com/office/drawing/2014/main" id="{CC545215-E5E5-4041-3584-51D0D60FFC75}"/>
+              </a:ext>
+            </a:extLst>
+          </p:cNvPr>
+          <p:cNvSpPr/>
+          <p:nvPr/>
+        </p:nvSpPr>
+        <p:spPr>
+          <a:xfrm>
+            <a:off x="8890201" y="3897740"/>
+            <a:ext cx="155448" cy="128016"/>
+          </a:xfrm>
+          <a:prstGeom prst="ellipse">
+            <a:avLst/>
+          </a:prstGeom>
+          <a:solidFill>
+            <a:schemeClr val="bg2">
+              <a:lumMod val="50000"/>
+            </a:schemeClr>
+          </a:solidFill>
+          <a:ln>
+            <a:noFill/>
+          </a:ln>
+        </p:spPr>
+        <p:style>
+          <a:lnRef idx="2">
+            <a:schemeClr val="accent1">
+              <a:shade val="15000"/>
+            </a:schemeClr>
+          </a:lnRef>
+          <a:fillRef idx="1">
+            <a:schemeClr val="accent1"/>
+          </a:fillRef>
+          <a:effectRef idx="0">
+            <a:schemeClr val="accent1"/>
+          </a:effectRef>
+          <a:fontRef idx="minor">
+            <a:schemeClr val="lt1"/>
+          </a:fontRef>
+        </p:style>
+        <p:txBody>
+          <a:bodyPr rtlCol="0" anchor="ctr"/>
+          <a:lstStyle/>
+          <a:p>
+            <a:pPr algn="ctr"/>
+            <a:endParaRPr lang="pt-BR"/>
+          </a:p>
+        </p:txBody>
+      </p:sp>
+      <p:sp>
+        <p:nvSpPr>
+          <p:cNvPr id="11" name="Oval 10">
+            <a:extLst>
+              <a:ext uri="{FF2B5EF4-FFF2-40B4-BE49-F238E27FC236}">
+                <a16:creationId xmlns:a16="http://schemas.microsoft.com/office/drawing/2014/main" id="{6F775FD5-52FB-CE45-B6C3-C540C9C44E9E}"/>
+              </a:ext>
+            </a:extLst>
+          </p:cNvPr>
+          <p:cNvSpPr/>
+          <p:nvPr/>
+        </p:nvSpPr>
+        <p:spPr>
+          <a:xfrm>
+            <a:off x="8538132" y="4171571"/>
+            <a:ext cx="155448" cy="128016"/>
+          </a:xfrm>
+          <a:prstGeom prst="ellipse">
+            <a:avLst/>
+          </a:prstGeom>
+          <a:solidFill>
+            <a:schemeClr val="bg2">
+              <a:lumMod val="50000"/>
+            </a:schemeClr>
+          </a:solidFill>
+          <a:ln>
+            <a:noFill/>
+          </a:ln>
+        </p:spPr>
+        <p:style>
+          <a:lnRef idx="2">
+            <a:schemeClr val="accent1">
+              <a:shade val="15000"/>
+            </a:schemeClr>
+          </a:lnRef>
+          <a:fillRef idx="1">
+            <a:schemeClr val="accent1"/>
+          </a:fillRef>
+          <a:effectRef idx="0">
+            <a:schemeClr val="accent1"/>
+          </a:effectRef>
+          <a:fontRef idx="minor">
+            <a:schemeClr val="lt1"/>
+          </a:fontRef>
+        </p:style>
+        <p:txBody>
+          <a:bodyPr rtlCol="0" anchor="ctr"/>
+          <a:lstStyle/>
+          <a:p>
+            <a:pPr algn="ctr"/>
+            <a:endParaRPr lang="pt-BR"/>
+          </a:p>
+        </p:txBody>
+      </p:sp>
+      <p:sp>
+        <p:nvSpPr>
+          <p:cNvPr id="12" name="Oval 11">
+            <a:extLst>
+              <a:ext uri="{FF2B5EF4-FFF2-40B4-BE49-F238E27FC236}">
+                <a16:creationId xmlns:a16="http://schemas.microsoft.com/office/drawing/2014/main" id="{1890F1D1-52FC-176F-50B6-B8159EF13ABC}"/>
+              </a:ext>
+            </a:extLst>
+          </p:cNvPr>
+          <p:cNvSpPr/>
+          <p:nvPr/>
+        </p:nvSpPr>
+        <p:spPr>
+          <a:xfrm>
+            <a:off x="9080904" y="4342715"/>
+            <a:ext cx="155448" cy="128016"/>
+          </a:xfrm>
+          <a:prstGeom prst="ellipse">
+            <a:avLst/>
+          </a:prstGeom>
+          <a:solidFill>
+            <a:schemeClr val="bg2">
+              <a:lumMod val="50000"/>
+            </a:schemeClr>
+          </a:solidFill>
+          <a:ln>
+            <a:noFill/>
+          </a:ln>
+        </p:spPr>
+        <p:style>
+          <a:lnRef idx="2">
+            <a:schemeClr val="accent1">
+              <a:shade val="15000"/>
+            </a:schemeClr>
+          </a:lnRef>
+          <a:fillRef idx="1">
+            <a:schemeClr val="accent1"/>
+          </a:fillRef>
+          <a:effectRef idx="0">
+            <a:schemeClr val="accent1"/>
+          </a:effectRef>
+          <a:fontRef idx="minor">
+            <a:schemeClr val="lt1"/>
+          </a:fontRef>
+        </p:style>
+        <p:txBody>
+          <a:bodyPr rtlCol="0" anchor="ctr"/>
+          <a:lstStyle/>
+          <a:p>
+            <a:pPr algn="ctr"/>
+            <a:endParaRPr lang="pt-BR" dirty="0"/>
+          </a:p>
+        </p:txBody>
+      </p:sp>
+      <p:sp>
+        <p:nvSpPr>
+          <p:cNvPr id="13" name="Oval 12">
+            <a:extLst>
+              <a:ext uri="{FF2B5EF4-FFF2-40B4-BE49-F238E27FC236}">
+                <a16:creationId xmlns:a16="http://schemas.microsoft.com/office/drawing/2014/main" id="{D3D5DEF8-AE46-2DAF-91D7-8B12702DB390}"/>
+              </a:ext>
+            </a:extLst>
+          </p:cNvPr>
+          <p:cNvSpPr/>
+          <p:nvPr/>
+        </p:nvSpPr>
+        <p:spPr>
+          <a:xfrm>
+            <a:off x="8890201" y="4132452"/>
+            <a:ext cx="155448" cy="128016"/>
+          </a:xfrm>
+          <a:prstGeom prst="ellipse">
+            <a:avLst/>
+          </a:prstGeom>
+          <a:solidFill>
+            <a:schemeClr val="bg2">
+              <a:lumMod val="50000"/>
+            </a:schemeClr>
+          </a:solidFill>
+          <a:ln>
+            <a:noFill/>
+          </a:ln>
+        </p:spPr>
+        <p:style>
+          <a:lnRef idx="2">
+            <a:schemeClr val="accent1">
+              <a:shade val="15000"/>
+            </a:schemeClr>
+          </a:lnRef>
+          <a:fillRef idx="1">
+            <a:schemeClr val="accent1"/>
+          </a:fillRef>
+          <a:effectRef idx="0">
+            <a:schemeClr val="accent1"/>
+          </a:effectRef>
+          <a:fontRef idx="minor">
+            <a:schemeClr val="lt1"/>
+          </a:fontRef>
+        </p:style>
+        <p:txBody>
+          <a:bodyPr rtlCol="0" anchor="ctr"/>
+          <a:lstStyle/>
+          <a:p>
+            <a:pPr algn="ctr"/>
+            <a:endParaRPr lang="pt-BR" dirty="0"/>
+          </a:p>
+        </p:txBody>
+      </p:sp>
+    </p:spTree>
+    <p:extLst>
+      <p:ext uri="{BB962C8B-B14F-4D97-AF65-F5344CB8AC3E}">
+        <p14:creationId xmlns:p14="http://schemas.microsoft.com/office/powerpoint/2010/main" val="4059081054"/>
       </p:ext>
     </p:extLst>
   </p:cSld>

</xml_diff>